<commit_message>
measure execution time of the model
</commit_message>
<xml_diff>
--- a/TASKS.pptx
+++ b/TASKS.pptx
@@ -108,6 +108,11 @@
       </a:defRPr>
     </a:lvl9pPr>
   </p:defaultTextStyle>
+  <p:extLst>
+    <p:ext uri="{EFAFB233-063F-42B5-8137-9DF3F51BA10A}">
+      <p15:sldGuideLst xmlns:p15="http://schemas.microsoft.com/office/powerpoint/2012/main"/>
+    </p:ext>
+  </p:extLst>
 </p:presentation>
 </file>
 
@@ -258,7 +263,7 @@
           <a:p>
             <a:fld id="{43B1497E-D8F5-4643-BA3C-EED634AF1070}" type="datetimeFigureOut">
               <a:rPr lang="it-IT" smtClean="0"/>
-              <a:t>09/12/2023</a:t>
+              <a:t>11/12/2023</a:t>
             </a:fld>
             <a:endParaRPr lang="it-IT"/>
           </a:p>
@@ -456,7 +461,7 @@
           <a:p>
             <a:fld id="{43B1497E-D8F5-4643-BA3C-EED634AF1070}" type="datetimeFigureOut">
               <a:rPr lang="it-IT" smtClean="0"/>
-              <a:t>09/12/2023</a:t>
+              <a:t>11/12/2023</a:t>
             </a:fld>
             <a:endParaRPr lang="it-IT"/>
           </a:p>
@@ -664,7 +669,7 @@
           <a:p>
             <a:fld id="{43B1497E-D8F5-4643-BA3C-EED634AF1070}" type="datetimeFigureOut">
               <a:rPr lang="it-IT" smtClean="0"/>
-              <a:t>09/12/2023</a:t>
+              <a:t>11/12/2023</a:t>
             </a:fld>
             <a:endParaRPr lang="it-IT"/>
           </a:p>
@@ -862,7 +867,7 @@
           <a:p>
             <a:fld id="{43B1497E-D8F5-4643-BA3C-EED634AF1070}" type="datetimeFigureOut">
               <a:rPr lang="it-IT" smtClean="0"/>
-              <a:t>09/12/2023</a:t>
+              <a:t>11/12/2023</a:t>
             </a:fld>
             <a:endParaRPr lang="it-IT"/>
           </a:p>
@@ -1137,7 +1142,7 @@
           <a:p>
             <a:fld id="{43B1497E-D8F5-4643-BA3C-EED634AF1070}" type="datetimeFigureOut">
               <a:rPr lang="it-IT" smtClean="0"/>
-              <a:t>09/12/2023</a:t>
+              <a:t>11/12/2023</a:t>
             </a:fld>
             <a:endParaRPr lang="it-IT"/>
           </a:p>
@@ -1402,7 +1407,7 @@
           <a:p>
             <a:fld id="{43B1497E-D8F5-4643-BA3C-EED634AF1070}" type="datetimeFigureOut">
               <a:rPr lang="it-IT" smtClean="0"/>
-              <a:t>09/12/2023</a:t>
+              <a:t>11/12/2023</a:t>
             </a:fld>
             <a:endParaRPr lang="it-IT"/>
           </a:p>
@@ -1814,7 +1819,7 @@
           <a:p>
             <a:fld id="{43B1497E-D8F5-4643-BA3C-EED634AF1070}" type="datetimeFigureOut">
               <a:rPr lang="it-IT" smtClean="0"/>
-              <a:t>09/12/2023</a:t>
+              <a:t>11/12/2023</a:t>
             </a:fld>
             <a:endParaRPr lang="it-IT"/>
           </a:p>
@@ -1955,7 +1960,7 @@
           <a:p>
             <a:fld id="{43B1497E-D8F5-4643-BA3C-EED634AF1070}" type="datetimeFigureOut">
               <a:rPr lang="it-IT" smtClean="0"/>
-              <a:t>09/12/2023</a:t>
+              <a:t>11/12/2023</a:t>
             </a:fld>
             <a:endParaRPr lang="it-IT"/>
           </a:p>
@@ -2068,7 +2073,7 @@
           <a:p>
             <a:fld id="{43B1497E-D8F5-4643-BA3C-EED634AF1070}" type="datetimeFigureOut">
               <a:rPr lang="it-IT" smtClean="0"/>
-              <a:t>09/12/2023</a:t>
+              <a:t>11/12/2023</a:t>
             </a:fld>
             <a:endParaRPr lang="it-IT"/>
           </a:p>
@@ -2379,7 +2384,7 @@
           <a:p>
             <a:fld id="{43B1497E-D8F5-4643-BA3C-EED634AF1070}" type="datetimeFigureOut">
               <a:rPr lang="it-IT" smtClean="0"/>
-              <a:t>09/12/2023</a:t>
+              <a:t>11/12/2023</a:t>
             </a:fld>
             <a:endParaRPr lang="it-IT"/>
           </a:p>
@@ -2667,7 +2672,7 @@
           <a:p>
             <a:fld id="{43B1497E-D8F5-4643-BA3C-EED634AF1070}" type="datetimeFigureOut">
               <a:rPr lang="it-IT" smtClean="0"/>
-              <a:t>09/12/2023</a:t>
+              <a:t>11/12/2023</a:t>
             </a:fld>
             <a:endParaRPr lang="it-IT"/>
           </a:p>
@@ -2908,7 +2913,7 @@
           <a:p>
             <a:fld id="{43B1497E-D8F5-4643-BA3C-EED634AF1070}" type="datetimeFigureOut">
               <a:rPr lang="it-IT" smtClean="0"/>
-              <a:t>09/12/2023</a:t>
+              <a:t>11/12/2023</a:t>
             </a:fld>
             <a:endParaRPr lang="it-IT"/>
           </a:p>
@@ -3526,35 +3531,35 @@
           </a:p>
           <a:p>
             <a:r>
-              <a:rPr lang="it-IT" dirty="0"/>
+              <a:rPr lang="it-IT" strike="sngStrike" dirty="0"/>
               <a:t>Compare </a:t>
             </a:r>
             <a:r>
-              <a:rPr lang="it-IT" dirty="0" err="1"/>
+              <a:rPr lang="it-IT" strike="sngStrike" dirty="0" err="1"/>
               <a:t>different</a:t>
             </a:r>
             <a:r>
-              <a:rPr lang="it-IT" dirty="0"/>
+              <a:rPr lang="it-IT" strike="sngStrike" dirty="0"/>
               <a:t> datasets from </a:t>
             </a:r>
             <a:r>
-              <a:rPr lang="it-IT" dirty="0" err="1"/>
+              <a:rPr lang="it-IT" strike="sngStrike" dirty="0" err="1"/>
               <a:t>hugging</a:t>
             </a:r>
             <a:r>
-              <a:rPr lang="it-IT" dirty="0"/>
+              <a:rPr lang="it-IT" strike="sngStrike" dirty="0"/>
               <a:t> face (</a:t>
             </a:r>
             <a:r>
-              <a:rPr lang="it-IT" dirty="0" err="1"/>
+              <a:rPr lang="it-IT" strike="sngStrike" dirty="0" err="1"/>
               <a:t>spanish,italian</a:t>
             </a:r>
             <a:r>
-              <a:rPr lang="it-IT" dirty="0"/>
+              <a:rPr lang="it-IT" strike="sngStrike" dirty="0"/>
               <a:t>, </a:t>
             </a:r>
             <a:r>
-              <a:rPr lang="it-IT" dirty="0" err="1"/>
+              <a:rPr lang="it-IT" strike="sngStrike" dirty="0" err="1"/>
               <a:t>english</a:t>
             </a:r>
             <a:r>

</xml_diff>